<commit_message>
Marketing Requirements Specification fix
</commit_message>
<xml_diff>
--- a/DOCS/REQUIREMENTS/Marketing Requirements Specification.pptx
+++ b/DOCS/REQUIREMENTS/Marketing Requirements Specification.pptx
@@ -23,14 +23,14 @@
   <p:notesSz cx="6858000" cy="9144000"/>
   <p:embeddedFontLst>
     <p:embeddedFont>
-      <p:font typeface="Nunito" panose="020B0604020202020204" charset="-52"/>
+      <p:font typeface="Calibri" panose="020F0502020204030204" pitchFamily="34" charset="0"/>
       <p:regular r:id="rId13"/>
       <p:bold r:id="rId14"/>
       <p:italic r:id="rId15"/>
       <p:boldItalic r:id="rId16"/>
     </p:embeddedFont>
     <p:embeddedFont>
-      <p:font typeface="Calibri" panose="020F0502020204030204" pitchFamily="34" charset="0"/>
+      <p:font typeface="Nunito" panose="020B0604020202020204" charset="-52"/>
       <p:regular r:id="rId17"/>
       <p:bold r:id="rId18"/>
       <p:italic r:id="rId19"/>
@@ -268,7 +268,7 @@
   </p:defaultTextStyle>
   <p:extLst>
     <p:ext uri="{EFAFB233-063F-42B5-8137-9DF3F51BA10A}">
-      <p15:sldGuideLst xmlns:ahyp="http://schemas.microsoft.com/office/drawing/2018/hyperlinkcolor" xmlns:p15="http://schemas.microsoft.com/office/powerpoint/2012/main" xmlns:p14="http://schemas.microsoft.com/office/powerpoint/2010/main" xmlns:com="http://schemas.openxmlformats.org/drawingml/2006/compatibility" xmlns:pvml="urn:schemas-microsoft-com:office:powerpoint" xmlns:v="urn:schemas-microsoft-com:vml" xmlns:o="urn:schemas-microsoft-com:office:office" xmlns:dgm="http://schemas.openxmlformats.org/drawingml/2006/diagram" xmlns:c="http://schemas.openxmlformats.org/drawingml/2006/chart" xmlns:mv="urn:schemas-microsoft-com:mac:vml" xmlns:mc="http://schemas.openxmlformats.org/markup-compatibility/2006" xmlns="">
+      <p15:sldGuideLst xmlns="" xmlns:mc="http://schemas.openxmlformats.org/markup-compatibility/2006" xmlns:mv="urn:schemas-microsoft-com:mac:vml" xmlns:c="http://schemas.openxmlformats.org/drawingml/2006/chart" xmlns:dgm="http://schemas.openxmlformats.org/drawingml/2006/diagram" xmlns:o="urn:schemas-microsoft-com:office:office" xmlns:v="urn:schemas-microsoft-com:vml" xmlns:pvml="urn:schemas-microsoft-com:office:powerpoint" xmlns:com="http://schemas.openxmlformats.org/drawingml/2006/compatibility" xmlns:p14="http://schemas.microsoft.com/office/powerpoint/2010/main" xmlns:p15="http://schemas.microsoft.com/office/powerpoint/2012/main" xmlns:ahyp="http://schemas.microsoft.com/office/drawing/2018/hyperlinkcolor">
         <p15:guide id="1" orient="horz" pos="1620">
           <p15:clr>
             <a:srgbClr val="A4A3A4"/>
@@ -1176,7 +1176,7 @@
         </p:nvSpPr>
         <p:spPr>
           <a:xfrm>
-            <a:off x="381300" y="685800"/>
+            <a:off x="381000" y="685800"/>
             <a:ext cx="6096000" cy="3429000"/>
           </a:xfrm>
           <a:custGeom>
@@ -1280,7 +1280,7 @@
         </p:nvSpPr>
         <p:spPr>
           <a:xfrm>
-            <a:off x="381300" y="685800"/>
+            <a:off x="381000" y="685800"/>
             <a:ext cx="6096000" cy="3429000"/>
           </a:xfrm>
           <a:custGeom>
@@ -9899,6 +9899,13 @@
   <p:clrMapOvr>
     <a:masterClrMapping/>
   </p:clrMapOvr>
+  <p:timing>
+    <p:tnLst>
+      <p:par>
+        <p:cTn id="1" dur="indefinite" restart="never" nodeType="tmRoot"/>
+      </p:par>
+    </p:tnLst>
+  </p:timing>
 </p:sld>
 </file>
 
@@ -10490,6 +10497,13 @@
   <p:clrMapOvr>
     <a:masterClrMapping/>
   </p:clrMapOvr>
+  <p:timing>
+    <p:tnLst>
+      <p:par>
+        <p:cTn id="1" dur="indefinite" restart="never" nodeType="tmRoot"/>
+      </p:par>
+    </p:tnLst>
+  </p:timing>
 </p:sld>
 </file>
 
@@ -10573,7 +10587,7 @@
         </p:spPr>
         <p:txBody>
           <a:bodyPr spcFirstLastPara="1" wrap="square" lIns="91425" tIns="91425" rIns="91425" bIns="91425" anchor="t" anchorCtr="0">
-            <a:normAutofit fontScale="62500" lnSpcReduction="20000"/>
+            <a:normAutofit fontScale="70000" lnSpcReduction="20000"/>
           </a:bodyPr>
           <a:lstStyle/>
           <a:p>
@@ -10669,6 +10683,13 @@
   <p:clrMapOvr>
     <a:masterClrMapping/>
   </p:clrMapOvr>
+  <p:timing>
+    <p:tnLst>
+      <p:par>
+        <p:cTn id="1" dur="indefinite" restart="never" nodeType="tmRoot"/>
+      </p:par>
+    </p:tnLst>
+  </p:timing>
 </p:sld>
 </file>
 
@@ -10744,7 +10765,7 @@
         <p:spPr>
           <a:xfrm>
             <a:off x="819150" y="1719625"/>
-            <a:ext cx="7505700" cy="2719200"/>
+            <a:ext cx="7597098" cy="2492157"/>
           </a:xfrm>
           <a:prstGeom prst="rect">
             <a:avLst/>
@@ -10752,7 +10773,7 @@
         </p:spPr>
         <p:txBody>
           <a:bodyPr spcFirstLastPara="1" wrap="square" lIns="91425" tIns="91425" rIns="91425" bIns="91425" anchor="t" anchorCtr="0">
-            <a:normAutofit fontScale="55000" lnSpcReduction="10000"/>
+            <a:normAutofit fontScale="40000" lnSpcReduction="20000"/>
           </a:bodyPr>
           <a:lstStyle/>
           <a:p>
@@ -10766,10 +10787,10 @@
               <a:buNone/>
             </a:pPr>
             <a:r>
-              <a:rPr lang="ru" sz="2900"/>
+              <a:rPr lang="ru" sz="4000" dirty="0"/>
               <a:t>Python – это универсальный современный язык программирования высокого уровня, к преимуществам которого относят высокую производительность программных решений и структурированный, хорошо читаемый код.</a:t>
             </a:r>
-            <a:endParaRPr sz="2900"/>
+            <a:endParaRPr sz="4000" dirty="0"/>
           </a:p>
           <a:p>
             <a:pPr marL="0" lvl="0" indent="0" algn="just" rtl="0">
@@ -10782,10 +10803,10 @@
               <a:buNone/>
             </a:pPr>
             <a:r>
-              <a:rPr lang="ru" sz="2900"/>
+              <a:rPr lang="ru" sz="4000" dirty="0"/>
               <a:t>Синтаксис этого языка максимально облегчен, что позволяет выучить его за сравнительно короткое время, а широкий перечень встроенных библиотек позволяет применять внушительный набор полезных функций и возможностей.  Python может использоваться для написания прикладных приложений, а также разработки web-сервисов.</a:t>
             </a:r>
-            <a:endParaRPr sz="2900"/>
+            <a:endParaRPr sz="4000" dirty="0"/>
           </a:p>
           <a:p>
             <a:pPr marL="457200" lvl="0" indent="0" algn="l" rtl="0">
@@ -10797,7 +10818,7 @@
               </a:spcAft>
               <a:buNone/>
             </a:pPr>
-            <a:endParaRPr sz="2100"/>
+            <a:endParaRPr sz="2100" dirty="0"/>
           </a:p>
         </p:txBody>
       </p:sp>
@@ -10876,6 +10897,13 @@
   <p:clrMapOvr>
     <a:masterClrMapping/>
   </p:clrMapOvr>
+  <p:timing>
+    <p:tnLst>
+      <p:par>
+        <p:cTn id="1" dur="indefinite" restart="never" nodeType="tmRoot"/>
+      </p:par>
+    </p:tnLst>
+  </p:timing>
 </p:sld>
 </file>
 
@@ -10951,7 +10979,7 @@
         <p:spPr>
           <a:xfrm>
             <a:off x="819150" y="1800200"/>
-            <a:ext cx="7505700" cy="2638500"/>
+            <a:ext cx="7505700" cy="2328455"/>
           </a:xfrm>
           <a:prstGeom prst="rect">
             <a:avLst/>
@@ -10959,7 +10987,7 @@
         </p:spPr>
         <p:txBody>
           <a:bodyPr spcFirstLastPara="1" wrap="square" lIns="91425" tIns="91425" rIns="91425" bIns="91425" anchor="t" anchorCtr="0">
-            <a:normAutofit fontScale="70000"/>
+            <a:normAutofit fontScale="47500" lnSpcReduction="20000"/>
           </a:bodyPr>
           <a:lstStyle/>
           <a:p>
@@ -10973,10 +11001,10 @@
               <a:buNone/>
             </a:pPr>
             <a:r>
-              <a:rPr lang="ru" sz="2400"/>
+              <a:rPr lang="ru" sz="3300" dirty="0"/>
               <a:t>Lua — скриптовый язык программирования.</a:t>
             </a:r>
-            <a:endParaRPr sz="2400"/>
+            <a:endParaRPr sz="3300" dirty="0"/>
           </a:p>
           <a:p>
             <a:pPr marL="0" lvl="0" indent="0" algn="just" rtl="0">
@@ -10989,10 +11017,10 @@
               <a:buNone/>
             </a:pPr>
             <a:r>
-              <a:rPr lang="ru" sz="2400"/>
+              <a:rPr lang="ru" sz="3300" dirty="0"/>
               <a:t>По идеологии и реализации язык Lua ближе всего к JavaScript, в частности, он также реализует прототипную модель ООП, но отличается паскалеподобным синтаксисом и более мощными и гибкими конструкциями.</a:t>
             </a:r>
-            <a:endParaRPr sz="2400"/>
+            <a:endParaRPr sz="3300" dirty="0"/>
           </a:p>
           <a:p>
             <a:pPr marL="0" lvl="0" indent="0" algn="just" rtl="0">
@@ -11005,10 +11033,10 @@
               <a:buNone/>
             </a:pPr>
             <a:r>
-              <a:rPr lang="ru" sz="2400"/>
+              <a:rPr lang="ru" sz="3300" dirty="0"/>
               <a:t>Характерной особенностью Lua является реализация большого числа программных сущностей минимумом синтаксических средств.</a:t>
             </a:r>
-            <a:endParaRPr sz="2400"/>
+            <a:endParaRPr sz="3300" dirty="0"/>
           </a:p>
           <a:p>
             <a:pPr marL="0" lvl="0" indent="0" algn="l" rtl="0">
@@ -11020,7 +11048,7 @@
               </a:spcAft>
               <a:buNone/>
             </a:pPr>
-            <a:endParaRPr sz="2100"/>
+            <a:endParaRPr sz="2100" dirty="0"/>
           </a:p>
         </p:txBody>
       </p:sp>
@@ -11099,6 +11127,13 @@
   <p:clrMapOvr>
     <a:masterClrMapping/>
   </p:clrMapOvr>
+  <p:timing>
+    <p:tnLst>
+      <p:par>
+        <p:cTn id="1" dur="indefinite" restart="never" nodeType="tmRoot"/>
+      </p:par>
+    </p:tnLst>
+  </p:timing>
 </p:sld>
 </file>
 
@@ -11342,6 +11377,13 @@
   <p:clrMapOvr>
     <a:masterClrMapping/>
   </p:clrMapOvr>
+  <p:timing>
+    <p:tnLst>
+      <p:par>
+        <p:cTn id="1" dur="indefinite" restart="never" nodeType="tmRoot"/>
+      </p:par>
+    </p:tnLst>
+  </p:timing>
 </p:sld>
 </file>
 
@@ -11763,6 +11805,13 @@
   <p:clrMapOvr>
     <a:masterClrMapping/>
   </p:clrMapOvr>
+  <p:timing>
+    <p:tnLst>
+      <p:par>
+        <p:cTn id="1" dur="indefinite" restart="never" nodeType="tmRoot"/>
+      </p:par>
+    </p:tnLst>
+  </p:timing>
 </p:sld>
 </file>
 

</xml_diff>

<commit_message>
Update Marketing Requirements Specification.pptx
</commit_message>
<xml_diff>
--- a/DOCS/REQUIREMENTS/Marketing Requirements Specification.pptx
+++ b/DOCS/REQUIREMENTS/Marketing Requirements Specification.pptx
@@ -268,7 +268,7 @@
   </p:defaultTextStyle>
   <p:extLst>
     <p:ext uri="{EFAFB233-063F-42B5-8137-9DF3F51BA10A}">
-      <p15:sldGuideLst xmlns="" xmlns:mc="http://schemas.openxmlformats.org/markup-compatibility/2006" xmlns:mv="urn:schemas-microsoft-com:mac:vml" xmlns:c="http://schemas.openxmlformats.org/drawingml/2006/chart" xmlns:dgm="http://schemas.openxmlformats.org/drawingml/2006/diagram" xmlns:o="urn:schemas-microsoft-com:office:office" xmlns:v="urn:schemas-microsoft-com:vml" xmlns:pvml="urn:schemas-microsoft-com:office:powerpoint" xmlns:com="http://schemas.openxmlformats.org/drawingml/2006/compatibility" xmlns:p14="http://schemas.microsoft.com/office/powerpoint/2010/main" xmlns:p15="http://schemas.microsoft.com/office/powerpoint/2012/main" xmlns:ahyp="http://schemas.microsoft.com/office/drawing/2018/hyperlinkcolor">
+      <p15:sldGuideLst xmlns:ahyp="http://schemas.microsoft.com/office/drawing/2018/hyperlinkcolor" xmlns:p15="http://schemas.microsoft.com/office/powerpoint/2012/main" xmlns:p14="http://schemas.microsoft.com/office/powerpoint/2010/main" xmlns:com="http://schemas.openxmlformats.org/drawingml/2006/compatibility" xmlns:pvml="urn:schemas-microsoft-com:office:powerpoint" xmlns:v="urn:schemas-microsoft-com:vml" xmlns:o="urn:schemas-microsoft-com:office:office" xmlns:dgm="http://schemas.openxmlformats.org/drawingml/2006/diagram" xmlns:c="http://schemas.openxmlformats.org/drawingml/2006/chart" xmlns:mv="urn:schemas-microsoft-com:mac:vml" xmlns:mc="http://schemas.openxmlformats.org/markup-compatibility/2006" xmlns="">
         <p15:guide id="1" orient="horz" pos="1620">
           <p15:clr>
             <a:srgbClr val="A4A3A4"/>
@@ -1592,7 +1592,7 @@
         </p:nvSpPr>
         <p:spPr>
           <a:xfrm>
-            <a:off x="381300" y="685800"/>
+            <a:off x="381000" y="685800"/>
             <a:ext cx="6096000" cy="3429000"/>
           </a:xfrm>
           <a:custGeom>
@@ -10234,6 +10234,13 @@
   <p:clrMapOvr>
     <a:masterClrMapping/>
   </p:clrMapOvr>
+  <p:timing>
+    <p:tnLst>
+      <p:par>
+        <p:cTn id="1" dur="indefinite" restart="never" nodeType="tmRoot"/>
+      </p:par>
+    </p:tnLst>
+  </p:timing>
 </p:sld>
 </file>
 
@@ -11914,27 +11921,15 @@
               <a:buChar char="●"/>
             </a:pPr>
             <a:r>
-              <a:rPr lang="ru" sz="1500">
+              <a:rPr lang="ru" sz="1500" dirty="0" smtClean="0">
                 <a:latin typeface="Arial"/>
                 <a:ea typeface="Arial"/>
                 <a:cs typeface="Arial"/>
                 <a:sym typeface="Arial"/>
               </a:rPr>
-              <a:t>Типы данных: </a:t>
+              <a:t>Операторы: +, -, *, /, %, **, ==, !=, &gt;, &lt;, &gt;=, &lt;=, and, or, not, in, =.</a:t>
             </a:r>
-            <a:r>
-              <a:rPr lang="ru" sz="1500">
-                <a:solidFill>
-                  <a:srgbClr val="000000"/>
-                </a:solidFill>
-                <a:latin typeface="Arial"/>
-                <a:ea typeface="Arial"/>
-                <a:cs typeface="Arial"/>
-                <a:sym typeface="Arial"/>
-              </a:rPr>
-              <a:t>Int, Float, String, Bool.</a:t>
-            </a:r>
-            <a:endParaRPr sz="1500">
+            <a:endParaRPr sz="1500" dirty="0" smtClean="0">
               <a:latin typeface="Arial"/>
               <a:ea typeface="Arial"/>
               <a:cs typeface="Arial"/>
@@ -11957,15 +11952,24 @@
               <a:buChar char="●"/>
             </a:pPr>
             <a:r>
-              <a:rPr lang="ru" sz="1500">
+              <a:rPr lang="ru" sz="1500" dirty="0" smtClean="0">
                 <a:latin typeface="Arial"/>
                 <a:ea typeface="Arial"/>
                 <a:cs typeface="Arial"/>
                 <a:sym typeface="Arial"/>
               </a:rPr>
-              <a:t>Операторы: +, -, *, /, %, **, ==, !=, &gt;, &lt;, &gt;=, &lt;=, and, or, not, in, =.</a:t>
+              <a:t>Операторы </a:t>
             </a:r>
-            <a:endParaRPr sz="1500">
+            <a:r>
+              <a:rPr lang="ru" sz="1500" dirty="0">
+                <a:latin typeface="Arial"/>
+                <a:ea typeface="Arial"/>
+                <a:cs typeface="Arial"/>
+                <a:sym typeface="Arial"/>
+              </a:rPr>
+              <a:t>циклов: for, while.</a:t>
+            </a:r>
+            <a:endParaRPr sz="1500" dirty="0">
               <a:latin typeface="Arial"/>
               <a:ea typeface="Arial"/>
               <a:cs typeface="Arial"/>
@@ -11988,15 +11992,15 @@
               <a:buChar char="●"/>
             </a:pPr>
             <a:r>
-              <a:rPr lang="ru" sz="1500">
+              <a:rPr lang="ru" sz="1500" dirty="0">
                 <a:latin typeface="Arial"/>
                 <a:ea typeface="Arial"/>
                 <a:cs typeface="Arial"/>
                 <a:sym typeface="Arial"/>
               </a:rPr>
-              <a:t>Операторы циклов: for, while.</a:t>
+              <a:t>Операторы ветвления: if, elif, else.</a:t>
             </a:r>
-            <a:endParaRPr sz="1500">
+            <a:endParaRPr sz="1500" dirty="0">
               <a:latin typeface="Arial"/>
               <a:ea typeface="Arial"/>
               <a:cs typeface="Arial"/>
@@ -12019,15 +12023,42 @@
               <a:buChar char="●"/>
             </a:pPr>
             <a:r>
-              <a:rPr lang="ru" sz="1500">
+              <a:rPr lang="ru" sz="1500" dirty="0">
                 <a:latin typeface="Arial"/>
                 <a:ea typeface="Arial"/>
                 <a:cs typeface="Arial"/>
                 <a:sym typeface="Arial"/>
               </a:rPr>
-              <a:t>Операторы ветвления: if, elif, else.</a:t>
+              <a:t>Стандартные функции: print, len, </a:t>
             </a:r>
-            <a:endParaRPr sz="1500">
+            <a:r>
+              <a:rPr lang="ru" sz="1500" dirty="0">
+                <a:latin typeface="Arial"/>
+                <a:ea typeface="Arial"/>
+                <a:cs typeface="Arial"/>
+                <a:sym typeface="Arial"/>
+              </a:rPr>
+              <a:t>dict</a:t>
+            </a:r>
+            <a:r>
+              <a:rPr lang="en-US" sz="1500" dirty="0">
+                <a:latin typeface="Arial"/>
+                <a:ea typeface="Arial"/>
+                <a:cs typeface="Arial"/>
+                <a:sym typeface="Arial"/>
+              </a:rPr>
+              <a:t>, </a:t>
+            </a:r>
+            <a:r>
+              <a:rPr lang="en-US" sz="1500" dirty="0" smtClean="0">
+                <a:latin typeface="Arial"/>
+                <a:ea typeface="Arial"/>
+                <a:cs typeface="Arial"/>
+                <a:sym typeface="Arial"/>
+              </a:rPr>
+              <a:t>range.</a:t>
+            </a:r>
+            <a:endParaRPr lang="en-US" sz="1500" dirty="0">
               <a:latin typeface="Arial"/>
               <a:ea typeface="Arial"/>
               <a:cs typeface="Arial"/>
@@ -12035,47 +12066,60 @@
             </a:endParaRPr>
           </a:p>
           <a:p>
-            <a:pPr marL="457200" lvl="0" indent="-323850" algn="just" rtl="0">
+            <a:pPr lvl="0" indent="-323850" algn="just">
               <a:lnSpc>
                 <a:spcPct val="150000"/>
               </a:lnSpc>
-              <a:spcBef>
-                <a:spcPts val="0"/>
-              </a:spcBef>
-              <a:spcAft>
-                <a:spcPts val="0"/>
-              </a:spcAft>
               <a:buSzPts val="1500"/>
               <a:buFont typeface="Arial"/>
               <a:buChar char="●"/>
             </a:pPr>
             <a:r>
-              <a:rPr lang="ru" sz="1500">
+              <a:rPr lang="ru-RU" sz="1500" dirty="0">
                 <a:latin typeface="Arial"/>
                 <a:ea typeface="Arial"/>
                 <a:cs typeface="Arial"/>
-                <a:sym typeface="Arial"/>
               </a:rPr>
-              <a:t>Стандартные функции: print, len, dict.</a:t>
+              <a:t>Логические константы: </a:t>
             </a:r>
-            <a:endParaRPr sz="1500">
+            <a:r>
+              <a:rPr lang="en-US" sz="1500" dirty="0">
+                <a:latin typeface="Arial"/>
+                <a:ea typeface="Arial"/>
+                <a:cs typeface="Arial"/>
+              </a:rPr>
+              <a:t>True</a:t>
+            </a:r>
+            <a:r>
+              <a:rPr lang="ru-RU" sz="1500" dirty="0">
+                <a:latin typeface="Arial"/>
+                <a:ea typeface="Arial"/>
+                <a:cs typeface="Arial"/>
+              </a:rPr>
+              <a:t>, </a:t>
+            </a:r>
+            <a:r>
+              <a:rPr lang="en-US" sz="1500" dirty="0">
+                <a:latin typeface="Arial"/>
+                <a:ea typeface="Arial"/>
+                <a:cs typeface="Arial"/>
+              </a:rPr>
+              <a:t>False</a:t>
+            </a:r>
+            <a:r>
+              <a:rPr lang="ru-RU" sz="1500" dirty="0" smtClean="0">
+                <a:latin typeface="Arial"/>
+                <a:ea typeface="Arial"/>
+                <a:cs typeface="Arial"/>
+              </a:rPr>
+              <a:t>.</a:t>
+            </a:r>
+            <a:endParaRPr sz="1500" dirty="0">
               <a:latin typeface="Arial"/>
               <a:ea typeface="Arial"/>
               <a:cs typeface="Arial"/>
               <a:sym typeface="Arial"/>
             </a:endParaRPr>
-          </a:p>
-          <a:p>
-            <a:pPr marL="0" lvl="0" indent="0" algn="l" rtl="0">
-              <a:spcBef>
-                <a:spcPts val="1200"/>
-              </a:spcBef>
-              <a:spcAft>
-                <a:spcPts val="1200"/>
-              </a:spcAft>
-              <a:buNone/>
-            </a:pPr>
-            <a:endParaRPr sz="2100"/>
           </a:p>
         </p:txBody>
       </p:sp>
@@ -12154,6 +12198,13 @@
   <p:clrMapOvr>
     <a:masterClrMapping/>
   </p:clrMapOvr>
+  <p:timing>
+    <p:tnLst>
+      <p:par>
+        <p:cTn id="1" dur="indefinite" restart="never" nodeType="tmRoot"/>
+      </p:par>
+    </p:tnLst>
+  </p:timing>
 </p:sld>
 </file>
 
@@ -12291,6 +12342,13 @@
   <p:clrMapOvr>
     <a:masterClrMapping/>
   </p:clrMapOvr>
+  <p:timing>
+    <p:tnLst>
+      <p:par>
+        <p:cTn id="1" dur="indefinite" restart="never" nodeType="tmRoot"/>
+      </p:par>
+    </p:tnLst>
+  </p:timing>
 </p:sld>
 </file>
 

</xml_diff>